<commit_message>
Deployed f60be5f with MkDocs version: 1.5.3
</commit_message>
<xml_diff>
--- a/slides/Unit2_Computation Problems and Algorithms.pptx
+++ b/slides/Unit2_Computation Problems and Algorithms.pptx
@@ -682,7 +682,7 @@
   <pc:docChgLst>
     <pc:chgData name="Zhao Jin" userId="cd05a825-544c-438a-9ba1-08e63db50b47" providerId="ADAL" clId="{E2987BAD-C905-4205-B950-38A39D6DBF0D}"/>
     <pc:docChg chg="undo redo custSel addSld delSld modSld">
-      <pc:chgData name="Zhao Jin" userId="cd05a825-544c-438a-9ba1-08e63db50b47" providerId="ADAL" clId="{E2987BAD-C905-4205-B950-38A39D6DBF0D}" dt="2024-01-16T04:08:50.101" v="1688" actId="20577"/>
+      <pc:chgData name="Zhao Jin" userId="cd05a825-544c-438a-9ba1-08e63db50b47" providerId="ADAL" clId="{E2987BAD-C905-4205-B950-38A39D6DBF0D}" dt="2024-01-23T00:25:13.953" v="1764" actId="20577"/>
       <pc:docMkLst>
         <pc:docMk/>
       </pc:docMkLst>
@@ -725,11 +725,19 @@
         </pc:spChg>
       </pc:sldChg>
       <pc:sldChg chg="modSp mod">
-        <pc:chgData name="Zhao Jin" userId="cd05a825-544c-438a-9ba1-08e63db50b47" providerId="ADAL" clId="{E2987BAD-C905-4205-B950-38A39D6DBF0D}" dt="2024-01-16T01:28:29.809" v="1408" actId="14734"/>
+        <pc:chgData name="Zhao Jin" userId="cd05a825-544c-438a-9ba1-08e63db50b47" providerId="ADAL" clId="{E2987BAD-C905-4205-B950-38A39D6DBF0D}" dt="2024-01-23T00:25:13.953" v="1764" actId="20577"/>
         <pc:sldMkLst>
           <pc:docMk/>
           <pc:sldMk cId="2484638736" sldId="490"/>
         </pc:sldMkLst>
+        <pc:spChg chg="mod">
+          <ac:chgData name="Zhao Jin" userId="cd05a825-544c-438a-9ba1-08e63db50b47" providerId="ADAL" clId="{E2987BAD-C905-4205-B950-38A39D6DBF0D}" dt="2024-01-23T00:25:13.953" v="1764" actId="20577"/>
+          <ac:spMkLst>
+            <pc:docMk/>
+            <pc:sldMk cId="2484638736" sldId="490"/>
+            <ac:spMk id="8" creationId="{00000000-0000-0000-0000-000000000000}"/>
+          </ac:spMkLst>
+        </pc:spChg>
         <pc:graphicFrameChg chg="modGraphic">
           <ac:chgData name="Zhao Jin" userId="cd05a825-544c-438a-9ba1-08e63db50b47" providerId="ADAL" clId="{E2987BAD-C905-4205-B950-38A39D6DBF0D}" dt="2024-01-16T01:28:29.809" v="1408" actId="14734"/>
           <ac:graphicFrameMkLst>
@@ -953,7 +961,7 @@
         </pc:picChg>
       </pc:sldChg>
       <pc:sldChg chg="modSp mod">
-        <pc:chgData name="Zhao Jin" userId="cd05a825-544c-438a-9ba1-08e63db50b47" providerId="ADAL" clId="{E2987BAD-C905-4205-B950-38A39D6DBF0D}" dt="2024-01-16T01:16:28.408" v="1019" actId="403"/>
+        <pc:chgData name="Zhao Jin" userId="cd05a825-544c-438a-9ba1-08e63db50b47" providerId="ADAL" clId="{E2987BAD-C905-4205-B950-38A39D6DBF0D}" dt="2024-01-22T08:06:28.784" v="1749" actId="20577"/>
         <pc:sldMkLst>
           <pc:docMk/>
           <pc:sldMk cId="39845570" sldId="522"/>
@@ -967,7 +975,7 @@
           </ac:spMkLst>
         </pc:spChg>
         <pc:spChg chg="mod">
-          <ac:chgData name="Zhao Jin" userId="cd05a825-544c-438a-9ba1-08e63db50b47" providerId="ADAL" clId="{E2987BAD-C905-4205-B950-38A39D6DBF0D}" dt="2024-01-16T01:16:28.408" v="1019" actId="403"/>
+          <ac:chgData name="Zhao Jin" userId="cd05a825-544c-438a-9ba1-08e63db50b47" providerId="ADAL" clId="{E2987BAD-C905-4205-B950-38A39D6DBF0D}" dt="2024-01-22T08:06:28.784" v="1749" actId="20577"/>
           <ac:spMkLst>
             <pc:docMk/>
             <pc:sldMk cId="39845570" sldId="522"/>
@@ -4009,7 +4017,7 @@
               <a:pPr>
                 <a:defRPr/>
               </a:pPr>
-              <a:t>1/16/2024</a:t>
+              <a:t>1/23/2024</a:t>
             </a:fld>
             <a:endParaRPr lang="en-US"/>
           </a:p>
@@ -14513,8 +14521,8 @@
         </p:nvSpPr>
         <p:spPr>
           <a:xfrm>
-            <a:off x="159403" y="4521600"/>
-            <a:ext cx="1897380" cy="391668"/>
+            <a:off x="159403" y="4314824"/>
+            <a:ext cx="1897380" cy="598444"/>
           </a:xfrm>
           <a:prstGeom prst="rect">
             <a:avLst/>
@@ -14543,7 +14551,6 @@
           <a:bodyPr rtlCol="0" anchor="ctr"/>
           <a:lstStyle/>
           <a:p>
-            <a:pPr algn="ctr"/>
             <a:r>
               <a:rPr lang="en-US" dirty="0">
                 <a:solidFill>
@@ -14558,7 +14565,38 @@
                   <a:srgbClr val="0000FF"/>
                 </a:solidFill>
               </a:rPr>
-              <a:t>5 9 8 1 3 2</a:t>
+              <a:t>6</a:t>
+            </a:r>
+            <a:br>
+              <a:rPr lang="en-US">
+                <a:solidFill>
+                  <a:schemeClr val="tx1"/>
+                </a:solidFill>
+              </a:rPr>
+            </a:br>
+            <a:r>
+              <a:rPr lang="en-US">
+                <a:solidFill>
+                  <a:schemeClr val="tx1"/>
+                </a:solidFill>
+              </a:rPr>
+              <a:t>          </a:t>
+            </a:r>
+            <a:r>
+              <a:rPr lang="en-US">
+                <a:solidFill>
+                  <a:srgbClr val="0000FF"/>
+                </a:solidFill>
+              </a:rPr>
+              <a:t>5 </a:t>
+            </a:r>
+            <a:r>
+              <a:rPr lang="en-US" dirty="0">
+                <a:solidFill>
+                  <a:srgbClr val="0000FF"/>
+                </a:solidFill>
+              </a:rPr>
+              <a:t>9 8 1 3 2</a:t>
             </a:r>
           </a:p>
         </p:txBody>
@@ -17712,7 +17750,15 @@
             </a:pPr>
             <a:r>
               <a:rPr lang="en-US" sz="2400" dirty="0"/>
-              <a:t>To be covered at the beginning of next lecture.</a:t>
+              <a:t>To </a:t>
+            </a:r>
+            <a:r>
+              <a:rPr lang="en-US" sz="2400"/>
+              <a:t>be discussed </a:t>
+            </a:r>
+            <a:r>
+              <a:rPr lang="en-US" sz="2400" dirty="0"/>
+              <a:t>in the forum</a:t>
             </a:r>
           </a:p>
           <a:p>

</xml_diff>